<commit_message>
fix a number of issues
</commit_message>
<xml_diff>
--- a/ChatGPT_from_zero.pptx
+++ b/ChatGPT_from_zero.pptx
@@ -19,6 +19,8 @@
     <p:sldId id="264" r:id="rId16"/>
     <p:sldId id="265" r:id="rId17"/>
     <p:sldId id="266" r:id="rId18"/>
+    <p:sldId id="267" r:id="rId19"/>
+    <p:sldId id="268" r:id="rId20"/>
   </p:sldIdLst>
   <p:sldSz cx="12192000" cy="6858000"/>
   <p:notesSz cx="6858000" cy="9144000"/>
@@ -2764,7 +2766,7 @@
       </p:grpSpPr>
       <p:sp>
         <p:nvSpPr>
-          <p:cNvPr id="125" name="Title 1"/>
+          <p:cNvPr id="128" name="Title 1"/>
           <p:cNvSpPr txBox="1"/>
           <p:nvPr>
             <p:ph type="title"/>
@@ -2785,14 +2787,14 @@
           <a:p>
             <a:pPr/>
             <a:r>
-              <a:t>Погнали</a:t>
+              <a:t>Функция правдоподобия</a:t>
             </a:r>
           </a:p>
         </p:txBody>
       </p:sp>
       <p:sp>
         <p:nvSpPr>
-          <p:cNvPr id="126" name="Content Placeholder 2"/>
+          <p:cNvPr id="129" name="Content Placeholder 2"/>
           <p:cNvSpPr txBox="1"/>
           <p:nvPr>
             <p:ph type="body" idx="1"/>
@@ -2817,7 +2819,7 @@
       </p:sp>
       <p:pic>
         <p:nvPicPr>
-          <p:cNvPr id="127" name="Picture 2" descr="Picture 2"/>
+          <p:cNvPr id="130" name="Picture 3" descr="Picture 3"/>
           <p:cNvPicPr>
             <a:picLocks noChangeAspect="1"/>
           </p:cNvPicPr>
@@ -2833,8 +2835,8 @@
         </p:blipFill>
         <p:spPr>
           <a:xfrm>
-            <a:off x="4189893" y="681037"/>
-            <a:ext cx="7088475" cy="5935737"/>
+            <a:off x="945083" y="1551702"/>
+            <a:ext cx="8649874" cy="5054772"/>
           </a:xfrm>
           <a:prstGeom prst="rect">
             <a:avLst/>
@@ -2872,7 +2874,7 @@
       </p:grpSpPr>
       <p:sp>
         <p:nvSpPr>
-          <p:cNvPr id="129" name="Title 1"/>
+          <p:cNvPr id="132" name="Title 1"/>
           <p:cNvSpPr txBox="1"/>
           <p:nvPr>
             <p:ph type="title"/>
@@ -2892,12 +2894,199 @@
           <a:lstStyle/>
           <a:p>
             <a:pPr/>
+            <a:r>
+              <a:t>Нормализуй это</a:t>
+            </a:r>
           </a:p>
         </p:txBody>
       </p:sp>
       <p:sp>
         <p:nvSpPr>
-          <p:cNvPr id="130" name="Content Placeholder 2"/>
+          <p:cNvPr id="133" name="Content Placeholder 2"/>
+          <p:cNvSpPr txBox="1"/>
+          <p:nvPr>
+            <p:ph type="body" idx="1"/>
+          </p:nvPr>
+        </p:nvSpPr>
+        <p:spPr>
+          <a:xfrm>
+            <a:off x="838200" y="1825625"/>
+            <a:ext cx="10515600" cy="4351338"/>
+          </a:xfrm>
+          <a:prstGeom prst="rect">
+            <a:avLst/>
+          </a:prstGeom>
+        </p:spPr>
+        <p:txBody>
+          <a:bodyPr/>
+          <a:lstStyle/>
+          <a:p>
+            <a:pPr/>
+          </a:p>
+        </p:txBody>
+      </p:sp>
+    </p:spTree>
+  </p:cSld>
+  <p:clrMapOvr>
+    <a:masterClrMapping/>
+  </p:clrMapOvr>
+  <p:transition xmlns:p14="http://schemas.microsoft.com/office/powerpoint/2010/main" spd="med" advClick="1"/>
+</p:sld>
+</file>
+
+<file path=ppt/slides/slide12.xml><?xml version="1.0" encoding="utf-8"?>
+<p:sld xmlns:a="http://schemas.openxmlformats.org/drawingml/2006/main" xmlns:r="http://schemas.openxmlformats.org/officeDocument/2006/relationships" xmlns:p="http://schemas.openxmlformats.org/presentationml/2006/main" xmlns:m="http://schemas.openxmlformats.org/officeDocument/2006/math" xmlns:a14="http://schemas.microsoft.com/office/drawing/2010/main" showMasterSp="1" showMasterPhAnim="1">
+  <p:cSld>
+    <p:spTree>
+      <p:nvGrpSpPr>
+        <p:cNvPr id="1" name=""/>
+        <p:cNvGrpSpPr/>
+        <p:nvPr/>
+      </p:nvGrpSpPr>
+      <p:grpSpPr>
+        <a:xfrm>
+          <a:off x="0" y="0"/>
+          <a:ext cx="0" cy="0"/>
+          <a:chOff x="0" y="0"/>
+          <a:chExt cx="0" cy="0"/>
+        </a:xfrm>
+      </p:grpSpPr>
+      <p:sp>
+        <p:nvSpPr>
+          <p:cNvPr id="135" name="Title 1"/>
+          <p:cNvSpPr txBox="1"/>
+          <p:nvPr>
+            <p:ph type="title"/>
+          </p:nvPr>
+        </p:nvSpPr>
+        <p:spPr>
+          <a:xfrm>
+            <a:off x="838200" y="365125"/>
+            <a:ext cx="10515600" cy="1325563"/>
+          </a:xfrm>
+          <a:prstGeom prst="rect">
+            <a:avLst/>
+          </a:prstGeom>
+        </p:spPr>
+        <p:txBody>
+          <a:bodyPr/>
+          <a:lstStyle/>
+          <a:p>
+            <a:pPr/>
+            <a:r>
+              <a:t>Погнали</a:t>
+            </a:r>
+          </a:p>
+        </p:txBody>
+      </p:sp>
+      <p:sp>
+        <p:nvSpPr>
+          <p:cNvPr id="136" name="Content Placeholder 2"/>
+          <p:cNvSpPr txBox="1"/>
+          <p:nvPr>
+            <p:ph type="body" idx="1"/>
+          </p:nvPr>
+        </p:nvSpPr>
+        <p:spPr>
+          <a:xfrm>
+            <a:off x="838200" y="1825625"/>
+            <a:ext cx="10515600" cy="4351338"/>
+          </a:xfrm>
+          <a:prstGeom prst="rect">
+            <a:avLst/>
+          </a:prstGeom>
+        </p:spPr>
+        <p:txBody>
+          <a:bodyPr/>
+          <a:lstStyle/>
+          <a:p>
+            <a:pPr/>
+          </a:p>
+        </p:txBody>
+      </p:sp>
+      <p:pic>
+        <p:nvPicPr>
+          <p:cNvPr id="137" name="Picture 2" descr="Picture 2"/>
+          <p:cNvPicPr>
+            <a:picLocks noChangeAspect="1"/>
+          </p:cNvPicPr>
+          <p:nvPr/>
+        </p:nvPicPr>
+        <p:blipFill>
+          <a:blip r:embed="rId2">
+            <a:extLst/>
+          </a:blip>
+          <a:stretch>
+            <a:fillRect/>
+          </a:stretch>
+        </p:blipFill>
+        <p:spPr>
+          <a:xfrm>
+            <a:off x="4189893" y="681037"/>
+            <a:ext cx="7088475" cy="5935737"/>
+          </a:xfrm>
+          <a:prstGeom prst="rect">
+            <a:avLst/>
+          </a:prstGeom>
+          <a:ln w="12700">
+            <a:miter lim="400000"/>
+          </a:ln>
+        </p:spPr>
+      </p:pic>
+    </p:spTree>
+  </p:cSld>
+  <p:clrMapOvr>
+    <a:masterClrMapping/>
+  </p:clrMapOvr>
+  <p:transition xmlns:p14="http://schemas.microsoft.com/office/powerpoint/2010/main" spd="med" advClick="1"/>
+</p:sld>
+</file>
+
+<file path=ppt/slides/slide13.xml><?xml version="1.0" encoding="utf-8"?>
+<p:sld xmlns:a="http://schemas.openxmlformats.org/drawingml/2006/main" xmlns:r="http://schemas.openxmlformats.org/officeDocument/2006/relationships" xmlns:p="http://schemas.openxmlformats.org/presentationml/2006/main" xmlns:m="http://schemas.openxmlformats.org/officeDocument/2006/math" xmlns:a14="http://schemas.microsoft.com/office/drawing/2010/main" showMasterSp="1" showMasterPhAnim="1">
+  <p:cSld>
+    <p:spTree>
+      <p:nvGrpSpPr>
+        <p:cNvPr id="1" name=""/>
+        <p:cNvGrpSpPr/>
+        <p:nvPr/>
+      </p:nvGrpSpPr>
+      <p:grpSpPr>
+        <a:xfrm>
+          <a:off x="0" y="0"/>
+          <a:ext cx="0" cy="0"/>
+          <a:chOff x="0" y="0"/>
+          <a:chExt cx="0" cy="0"/>
+        </a:xfrm>
+      </p:grpSpPr>
+      <p:sp>
+        <p:nvSpPr>
+          <p:cNvPr id="139" name="Title 1"/>
+          <p:cNvSpPr txBox="1"/>
+          <p:nvPr>
+            <p:ph type="title"/>
+          </p:nvPr>
+        </p:nvSpPr>
+        <p:spPr>
+          <a:xfrm>
+            <a:off x="838200" y="365125"/>
+            <a:ext cx="10515600" cy="1325563"/>
+          </a:xfrm>
+          <a:prstGeom prst="rect">
+            <a:avLst/>
+          </a:prstGeom>
+        </p:spPr>
+        <p:txBody>
+          <a:bodyPr/>
+          <a:lstStyle/>
+          <a:p>
+            <a:pPr/>
+          </a:p>
+        </p:txBody>
+      </p:sp>
+      <p:sp>
+        <p:nvSpPr>
+          <p:cNvPr id="140" name="Content Placeholder 2"/>
           <p:cNvSpPr txBox="1"/>
           <p:nvPr>
             <p:ph type="body" idx="1"/>
@@ -2957,7 +3146,7 @@
       </p:sp>
       <p:pic>
         <p:nvPicPr>
-          <p:cNvPr id="131" name="Picture 2" descr="Picture 2"/>
+          <p:cNvPr id="141" name="Picture 2" descr="Picture 2"/>
           <p:cNvPicPr>
             <a:picLocks noChangeAspect="1"/>
           </p:cNvPicPr>
@@ -3048,8 +3237,8 @@
         </p:nvSpPr>
         <p:spPr>
           <a:xfrm>
-            <a:off x="838200" y="1825625"/>
-            <a:ext cx="10515600" cy="4351338"/>
+            <a:off x="670833" y="1658258"/>
+            <a:ext cx="10515601" cy="4351339"/>
           </a:xfrm>
           <a:prstGeom prst="rect">
             <a:avLst/>
@@ -3059,7 +3248,20 @@
           <a:bodyPr/>
           <a:lstStyle/>
           <a:p>
-            <a:pPr/>
+            <a:pPr marL="201168" indent="-201168" defTabSz="804672">
+              <a:spcBef>
+                <a:spcPts val="800"/>
+              </a:spcBef>
+              <a:defRPr sz="2464"/>
+            </a:pPr>
+          </a:p>
+          <a:p>
+            <a:pPr marL="201168" indent="-201168" defTabSz="804672">
+              <a:spcBef>
+                <a:spcPts val="800"/>
+              </a:spcBef>
+              <a:defRPr sz="2464"/>
+            </a:pPr>
             <a:r>
               <a:rPr u="sng">
                 <a:solidFill>
@@ -3072,15 +3274,15 @@
                 </a:uFill>
                 <a:hlinkClick r:id="rId2" invalidUrl="" action="" tgtFrame="" tooltip="" history="1" highlightClick="0" endSnd="0"/>
               </a:rPr>
-              <a:t>https://karpathy.ai/zero-to-hero.html</a:t>
-            </a:r>
-          </a:p>
-          <a:p>
-            <a:pPr lvl="1" marL="685800" indent="-228600">
+              <a:t>https://github.com/artem-aliev/nlp-notes</a:t>
+            </a:r>
+          </a:p>
+          <a:p>
+            <a:pPr lvl="1" marL="603504" indent="-201168" defTabSz="804672">
               <a:spcBef>
-                <a:spcPts val="500"/>
+                <a:spcPts val="800"/>
               </a:spcBef>
-              <a:defRPr sz="2400"/>
+              <a:defRPr sz="2464"/>
             </a:pPr>
             <a:r>
               <a:rPr u="sng">
@@ -3094,15 +3296,15 @@
                 </a:uFill>
                 <a:hlinkClick r:id="rId3" invalidUrl="" action="" tgtFrame="" tooltip="" history="1" highlightClick="0" endSnd="0"/>
               </a:rPr>
-              <a:t>https://github.com/karpathy/nn-zero-to-hero</a:t>
-            </a:r>
-          </a:p>
-          <a:p>
-            <a:pPr lvl="1" marL="685800" indent="-228600">
+              <a:t>https://github.com/artem-aliev/nn-zero-to-hero</a:t>
+            </a:r>
+          </a:p>
+          <a:p>
+            <a:pPr lvl="1" marL="603504" indent="-201168" defTabSz="804672">
               <a:spcBef>
-                <a:spcPts val="500"/>
+                <a:spcPts val="800"/>
               </a:spcBef>
-              <a:defRPr sz="2400"/>
+              <a:defRPr sz="2464"/>
             </a:pPr>
             <a:r>
               <a:rPr u="sng">
@@ -3118,19 +3320,37 @@
               </a:rPr>
               <a:t>https://github.com/artem-aliev/ng-video-lecture</a:t>
             </a:r>
-          </a:p>
-          <a:p>
-            <a:pPr/>
-            <a:r>
-              <a:t>Datasets</a:t>
-            </a:r>
-          </a:p>
-          <a:p>
-            <a:pPr lvl="1" marL="685800" indent="-228600">
+            <a:endParaRPr>
+              <a:solidFill>
+                <a:srgbClr val="1F2328"/>
+              </a:solidFill>
+            </a:endParaRPr>
+          </a:p>
+          <a:p>
+            <a:pPr lvl="1" marL="546027" indent="-143691" defTabSz="402336">
+              <a:lnSpc>
+                <a:spcPct val="100000"/>
+              </a:lnSpc>
               <a:spcBef>
-                <a:spcPts val="500"/>
+                <a:spcPts val="0"/>
               </a:spcBef>
-              <a:defRPr sz="2400"/>
+              <a:defRPr b="1" sz="1760">
+                <a:solidFill>
+                  <a:srgbClr val="0969DA"/>
+                </a:solidFill>
+                <a:latin typeface="+mj-lt"/>
+                <a:ea typeface="+mj-ea"/>
+                <a:cs typeface="+mj-cs"/>
+                <a:sym typeface="Helvetica"/>
+              </a:defRPr>
+            </a:pPr>
+          </a:p>
+          <a:p>
+            <a:pPr marL="201168" indent="-201168" defTabSz="804672">
+              <a:spcBef>
+                <a:spcPts val="800"/>
+              </a:spcBef>
+              <a:defRPr sz="2464"/>
             </a:pPr>
             <a:r>
               <a:rPr u="sng">
@@ -3144,15 +3364,15 @@
                 </a:uFill>
                 <a:hlinkClick r:id="rId5" invalidUrl="" action="" tgtFrame="" tooltip="" history="1" highlightClick="0" endSnd="0"/>
               </a:rPr>
-              <a:t>https://github.com/Raven-SL/ru-pnames-list/tree/master/lists</a:t>
-            </a:r>
-          </a:p>
-          <a:p>
-            <a:pPr lvl="1" marL="685800" indent="-228600">
+              <a:t>https://karpathy.ai/zero-to-hero.html</a:t>
+            </a:r>
+          </a:p>
+          <a:p>
+            <a:pPr lvl="1" marL="603504" indent="-201168" defTabSz="804672">
               <a:spcBef>
-                <a:spcPts val="500"/>
+                <a:spcPts val="400"/>
               </a:spcBef>
-              <a:defRPr sz="2400"/>
+              <a:defRPr sz="2112"/>
             </a:pPr>
             <a:r>
               <a:rPr u="sng">
@@ -3165,6 +3385,83 @@
                   </a:solidFill>
                 </a:uFill>
                 <a:hlinkClick r:id="rId6" invalidUrl="" action="" tgtFrame="" tooltip="" history="1" highlightClick="0" endSnd="0"/>
+              </a:rPr>
+              <a:t>https://github.com/karpathy/nn-zero-to-hero</a:t>
+            </a:r>
+          </a:p>
+          <a:p>
+            <a:pPr lvl="1" marL="603504" indent="-201168" defTabSz="804672">
+              <a:spcBef>
+                <a:spcPts val="400"/>
+              </a:spcBef>
+              <a:defRPr sz="2112"/>
+            </a:pPr>
+            <a:r>
+              <a:rPr u="sng">
+                <a:solidFill>
+                  <a:srgbClr val="0563C1"/>
+                </a:solidFill>
+                <a:uFill>
+                  <a:solidFill>
+                    <a:srgbClr val="0563C1"/>
+                  </a:solidFill>
+                </a:uFill>
+                <a:hlinkClick r:id="rId7" invalidUrl="" action="" tgtFrame="" tooltip="" history="1" highlightClick="0" endSnd="0"/>
+              </a:rPr>
+              <a:t>https://github.com/karpathy/ng-video-lecture</a:t>
+            </a:r>
+          </a:p>
+          <a:p>
+            <a:pPr marL="201168" indent="-201168" defTabSz="804672">
+              <a:spcBef>
+                <a:spcPts val="800"/>
+              </a:spcBef>
+              <a:defRPr sz="2464"/>
+            </a:pPr>
+            <a:r>
+              <a:t>Datasets</a:t>
+            </a:r>
+          </a:p>
+          <a:p>
+            <a:pPr lvl="1" marL="603504" indent="-201168" defTabSz="804672">
+              <a:spcBef>
+                <a:spcPts val="400"/>
+              </a:spcBef>
+              <a:defRPr sz="2112"/>
+            </a:pPr>
+            <a:r>
+              <a:rPr u="sng">
+                <a:solidFill>
+                  <a:srgbClr val="0563C1"/>
+                </a:solidFill>
+                <a:uFill>
+                  <a:solidFill>
+                    <a:srgbClr val="0563C1"/>
+                  </a:solidFill>
+                </a:uFill>
+                <a:hlinkClick r:id="rId8" invalidUrl="" action="" tgtFrame="" tooltip="" history="1" highlightClick="0" endSnd="0"/>
+              </a:rPr>
+              <a:t>https://github.com/Raven-SL/ru-pnames-list/tree/master/lists</a:t>
+            </a:r>
+          </a:p>
+          <a:p>
+            <a:pPr lvl="1" marL="603504" indent="-201168" defTabSz="804672">
+              <a:spcBef>
+                <a:spcPts val="400"/>
+              </a:spcBef>
+              <a:defRPr sz="2112"/>
+            </a:pPr>
+            <a:r>
+              <a:rPr u="sng">
+                <a:solidFill>
+                  <a:srgbClr val="0563C1"/>
+                </a:solidFill>
+                <a:uFill>
+                  <a:solidFill>
+                    <a:srgbClr val="0563C1"/>
+                  </a:solidFill>
+                </a:uFill>
+                <a:hlinkClick r:id="rId9" invalidUrl="" action="" tgtFrame="" tooltip="" history="1" highlightClick="0" endSnd="0"/>
               </a:rPr>
               <a:t>https://raw.githubusercontent.com/dominictarr/random-name/master/names.txt</a:t>
             </a:r>
@@ -3199,17 +3496,13 @@
       </p:grpSpPr>
       <p:sp>
         <p:nvSpPr>
-          <p:cNvPr id="101" name="Title 3"/>
+          <p:cNvPr id="101" name="Double-click to edit"/>
           <p:cNvSpPr txBox="1"/>
           <p:nvPr>
             <p:ph type="title"/>
           </p:nvPr>
         </p:nvSpPr>
         <p:spPr>
-          <a:xfrm>
-            <a:off x="838200" y="365125"/>
-            <a:ext cx="10515600" cy="1325563"/>
-          </a:xfrm>
           <a:prstGeom prst="rect">
             <a:avLst/>
           </a:prstGeom>
@@ -3219,36 +3512,21 @@
           <a:lstStyle/>
           <a:p>
             <a:pPr/>
-            <a:r>
-              <a:t>Наука</a:t>
-            </a:r>
-            <a:r>
-              <a:t>: </a:t>
-            </a:r>
-            <a:r>
-              <a:t>предсказание</a:t>
-            </a:r>
-            <a:r>
-              <a:t> </a:t>
-            </a:r>
-            <a:r>
-              <a:t>будущего</a:t>
-            </a:r>
           </a:p>
         </p:txBody>
       </p:sp>
       <p:sp>
         <p:nvSpPr>
-          <p:cNvPr id="102" name="Content Placeholder 4"/>
+          <p:cNvPr id="102" name="Telegram:"/>
           <p:cNvSpPr txBox="1"/>
           <p:nvPr>
-            <p:ph type="body" idx="1"/>
+            <p:ph type="body" sz="half" idx="1"/>
           </p:nvPr>
         </p:nvSpPr>
         <p:spPr>
           <a:xfrm>
-            <a:off x="838200" y="1825625"/>
-            <a:ext cx="10515600" cy="4351338"/>
+            <a:off x="838200" y="1799876"/>
+            <a:ext cx="5228018" cy="4469367"/>
           </a:xfrm>
           <a:prstGeom prst="rect">
             <a:avLst/>
@@ -3260,14 +3538,14 @@
           <a:p>
             <a:pPr/>
             <a:r>
-              <a:t>Как быстро шар долетит до земли</a:t>
+              <a:t>Telegram:</a:t>
             </a:r>
           </a:p>
         </p:txBody>
       </p:sp>
       <p:pic>
         <p:nvPicPr>
-          <p:cNvPr id="103" name="Picture 2" descr="Picture 2"/>
+          <p:cNvPr id="103" name="pasted-movie.png" descr="pasted-movie.png"/>
           <p:cNvPicPr>
             <a:picLocks noChangeAspect="1"/>
           </p:cNvPicPr>
@@ -3283,8 +3561,8 @@
         </p:blipFill>
         <p:spPr>
           <a:xfrm>
-            <a:off x="8033812" y="1825625"/>
-            <a:ext cx="2724623" cy="4351338"/>
+            <a:off x="969089" y="2282271"/>
+            <a:ext cx="3908275" cy="3908275"/>
           </a:xfrm>
           <a:prstGeom prst="rect">
             <a:avLst/>
@@ -3294,6 +3572,84 @@
           </a:ln>
         </p:spPr>
       </p:pic>
+      <p:pic>
+        <p:nvPicPr>
+          <p:cNvPr id="104" name="pasted-movie.png" descr="pasted-movie.png"/>
+          <p:cNvPicPr>
+            <a:picLocks noChangeAspect="1"/>
+          </p:cNvPicPr>
+          <p:nvPr/>
+        </p:nvPicPr>
+        <p:blipFill>
+          <a:blip r:embed="rId3">
+            <a:extLst/>
+          </a:blip>
+          <a:stretch>
+            <a:fillRect/>
+          </a:stretch>
+        </p:blipFill>
+        <p:spPr>
+          <a:xfrm>
+            <a:off x="6854318" y="2360346"/>
+            <a:ext cx="3752127" cy="3752126"/>
+          </a:xfrm>
+          <a:prstGeom prst="rect">
+            <a:avLst/>
+          </a:prstGeom>
+          <a:ln w="12700">
+            <a:miter lim="400000"/>
+          </a:ln>
+        </p:spPr>
+      </p:pic>
+      <p:sp>
+        <p:nvSpPr>
+          <p:cNvPr id="105" name="Github"/>
+          <p:cNvSpPr txBox="1"/>
+          <p:nvPr/>
+        </p:nvSpPr>
+        <p:spPr>
+          <a:xfrm>
+            <a:off x="6745108" y="1901127"/>
+            <a:ext cx="4971202" cy="4153711"/>
+          </a:xfrm>
+          <a:prstGeom prst="rect">
+            <a:avLst/>
+          </a:prstGeom>
+          <a:ln w="12700">
+            <a:miter lim="400000"/>
+          </a:ln>
+          <a:extLst>
+            <a:ext uri="{C572A759-6A51-4108-AA02-DFA0A04FC94B}">
+              <ma14:wrappingTextBoxFlag xmlns:ma14="http://schemas.microsoft.com/office/mac/drawingml/2011/main" val="1"/>
+            </a:ext>
+          </a:extLst>
+        </p:spPr>
+        <p:txBody>
+          <a:bodyPr lIns="45719" rIns="45719">
+            <a:normAutofit fontScale="100000" lnSpcReduction="0"/>
+          </a:bodyPr>
+          <a:lstStyle>
+            <a:lvl1pPr marL="228600" indent="-228600">
+              <a:lnSpc>
+                <a:spcPct val="90000"/>
+              </a:lnSpc>
+              <a:spcBef>
+                <a:spcPts val="1000"/>
+              </a:spcBef>
+              <a:buSzPct val="100000"/>
+              <a:buFont typeface="Arial"/>
+              <a:buChar char="•"/>
+              <a:defRPr sz="2800"/>
+            </a:lvl1pPr>
+          </a:lstStyle>
+          <a:p>
+            <a:pPr/>
+            <a:r>
+              <a:t>Github</a:t>
+            </a:r>
+          </a:p>
+        </p:txBody>
+      </p:sp>
     </p:spTree>
   </p:cSld>
   <p:clrMapOvr>
@@ -3322,7 +3678,7 @@
       </p:grpSpPr>
       <p:sp>
         <p:nvSpPr>
-          <p:cNvPr id="105" name="Title 1"/>
+          <p:cNvPr id="107" name="Title 3"/>
           <p:cNvSpPr txBox="1"/>
           <p:nvPr>
             <p:ph type="title"/>
@@ -3343,14 +3699,26 @@
           <a:p>
             <a:pPr/>
             <a:r>
-              <a:t>Линейная регрессия</a:t>
+              <a:t>Наука</a:t>
+            </a:r>
+            <a:r>
+              <a:t>: </a:t>
+            </a:r>
+            <a:r>
+              <a:t>предсказание</a:t>
+            </a:r>
+            <a:r>
+              <a:t> </a:t>
+            </a:r>
+            <a:r>
+              <a:t>будущего</a:t>
             </a:r>
           </a:p>
         </p:txBody>
       </p:sp>
       <p:sp>
         <p:nvSpPr>
-          <p:cNvPr id="106" name="Content Placeholder 2"/>
+          <p:cNvPr id="108" name="Content Placeholder 4"/>
           <p:cNvSpPr txBox="1"/>
           <p:nvPr>
             <p:ph type="body" idx="1"/>
@@ -3370,9 +3738,41 @@
           <a:lstStyle/>
           <a:p>
             <a:pPr/>
+            <a:r>
+              <a:t>Как быстро шар долетит до земли</a:t>
+            </a:r>
           </a:p>
         </p:txBody>
       </p:sp>
+      <p:pic>
+        <p:nvPicPr>
+          <p:cNvPr id="109" name="Picture 2" descr="Picture 2"/>
+          <p:cNvPicPr>
+            <a:picLocks noChangeAspect="1"/>
+          </p:cNvPicPr>
+          <p:nvPr/>
+        </p:nvPicPr>
+        <p:blipFill>
+          <a:blip r:embed="rId2">
+            <a:extLst/>
+          </a:blip>
+          <a:stretch>
+            <a:fillRect/>
+          </a:stretch>
+        </p:blipFill>
+        <p:spPr>
+          <a:xfrm>
+            <a:off x="8033812" y="1825625"/>
+            <a:ext cx="2724623" cy="4351338"/>
+          </a:xfrm>
+          <a:prstGeom prst="rect">
+            <a:avLst/>
+          </a:prstGeom>
+          <a:ln w="12700">
+            <a:miter lim="400000"/>
+          </a:ln>
+        </p:spPr>
+      </p:pic>
     </p:spTree>
   </p:cSld>
   <p:clrMapOvr>
@@ -3401,7 +3801,7 @@
       </p:grpSpPr>
       <p:sp>
         <p:nvSpPr>
-          <p:cNvPr id="108" name="Title 1"/>
+          <p:cNvPr id="111" name="Title 1"/>
           <p:cNvSpPr txBox="1"/>
           <p:nvPr>
             <p:ph type="title"/>
@@ -3422,17 +3822,14 @@
           <a:p>
             <a:pPr/>
             <a:r>
-              <a:t>Производные и </a:t>
-            </a:r>
-            <a:r>
-              <a:t>Backpropogation</a:t>
+              <a:t>Линейная регрессия</a:t>
             </a:r>
           </a:p>
         </p:txBody>
       </p:sp>
       <p:sp>
         <p:nvSpPr>
-          <p:cNvPr id="109" name="Content Placeholder 2"/>
+          <p:cNvPr id="112" name="Content Placeholder 2"/>
           <p:cNvSpPr txBox="1"/>
           <p:nvPr>
             <p:ph type="body" idx="1"/>
@@ -3483,7 +3880,7 @@
       </p:grpSpPr>
       <p:sp>
         <p:nvSpPr>
-          <p:cNvPr id="111" name="Title 1"/>
+          <p:cNvPr id="114" name="Title 1"/>
           <p:cNvSpPr txBox="1"/>
           <p:nvPr>
             <p:ph type="title"/>
@@ -3504,45 +3901,17 @@
           <a:p>
             <a:pPr/>
             <a:r>
-              <a:t>Классификация текстов</a:t>
-            </a:r>
-          </a:p>
-        </p:txBody>
-      </p:sp>
-      <p:sp>
-        <p:nvSpPr>
-          <p:cNvPr id="112" name="Content Placeholder 2"/>
-          <p:cNvSpPr txBox="1"/>
-          <p:nvPr>
-            <p:ph type="body" idx="1"/>
-          </p:nvPr>
-        </p:nvSpPr>
-        <p:spPr>
-          <a:xfrm>
-            <a:off x="838200" y="1825625"/>
-            <a:ext cx="10515600" cy="4351338"/>
-          </a:xfrm>
-          <a:prstGeom prst="rect">
-            <a:avLst/>
-          </a:prstGeom>
-        </p:spPr>
-        <p:txBody>
-          <a:bodyPr/>
-          <a:lstStyle/>
-          <a:p>
-            <a:pPr/>
-            <a:r>
-              <a:t>Паустовский или Пришвин</a:t>
-            </a:r>
-            <a:r>
-              <a:t>?</a:t>
+              <a:t>Производные и </a:t>
+            </a:r>
+            <a:r>
+              <a:t>Backpropogation</a:t>
             </a:r>
           </a:p>
         </p:txBody>
       </p:sp>
       <p:pic>
         <p:nvPicPr>
-          <p:cNvPr id="113" name="Picture 3" descr="Picture 3"/>
+          <p:cNvPr id="115" name="Image" descr="Image"/>
           <p:cNvPicPr>
             <a:picLocks noChangeAspect="1"/>
           </p:cNvPicPr>
@@ -3558,8 +3927,37 @@
         </p:blipFill>
         <p:spPr>
           <a:xfrm>
-            <a:off x="8390086" y="1940927"/>
-            <a:ext cx="3267076" cy="1638301"/>
+            <a:off x="5173309" y="1713775"/>
+            <a:ext cx="5552337" cy="4164254"/>
+          </a:xfrm>
+          <a:prstGeom prst="rect">
+            <a:avLst/>
+          </a:prstGeom>
+          <a:ln w="12700">
+            <a:miter lim="400000"/>
+          </a:ln>
+        </p:spPr>
+      </p:pic>
+      <p:pic>
+        <p:nvPicPr>
+          <p:cNvPr id="116" name="1.svg" descr="1.svg"/>
+          <p:cNvPicPr>
+            <a:picLocks noChangeAspect="1"/>
+          </p:cNvPicPr>
+          <p:nvPr/>
+        </p:nvPicPr>
+        <p:blipFill>
+          <a:blip r:embed="rId3">
+            <a:extLst/>
+          </a:blip>
+          <a:stretch>
+            <a:fillRect/>
+          </a:stretch>
+        </p:blipFill>
+        <p:spPr>
+          <a:xfrm>
+            <a:off x="1429277" y="1928893"/>
+            <a:ext cx="2674845" cy="961244"/>
           </a:xfrm>
           <a:prstGeom prst="rect">
             <a:avLst/>
@@ -3597,17 +3995,13 @@
       </p:grpSpPr>
       <p:sp>
         <p:nvSpPr>
-          <p:cNvPr id="115" name="Title 1"/>
+          <p:cNvPr id="118" name="Перцептрон"/>
           <p:cNvSpPr txBox="1"/>
           <p:nvPr>
             <p:ph type="title"/>
           </p:nvPr>
         </p:nvSpPr>
         <p:spPr>
-          <a:xfrm>
-            <a:off x="838200" y="365125"/>
-            <a:ext cx="10515600" cy="1325563"/>
-          </a:xfrm>
           <a:prstGeom prst="rect">
             <a:avLst/>
           </a:prstGeom>
@@ -3618,14 +4012,14 @@
           <a:p>
             <a:pPr/>
             <a:r>
-              <a:t>Ембединги </a:t>
+              <a:t>Перцептрон</a:t>
             </a:r>
           </a:p>
         </p:txBody>
       </p:sp>
       <p:sp>
         <p:nvSpPr>
-          <p:cNvPr id="116" name="Content Placeholder 2"/>
+          <p:cNvPr id="119" name="1949 год"/>
           <p:cNvSpPr txBox="1"/>
           <p:nvPr>
             <p:ph type="body" idx="1"/>
@@ -3633,8 +4027,8 @@
         </p:nvSpPr>
         <p:spPr>
           <a:xfrm>
-            <a:off x="838200" y="1825625"/>
-            <a:ext cx="10515600" cy="4351338"/>
+            <a:off x="588403" y="2065814"/>
+            <a:ext cx="10515601" cy="4351339"/>
           </a:xfrm>
           <a:prstGeom prst="rect">
             <a:avLst/>
@@ -3645,9 +4039,41 @@
           <a:lstStyle/>
           <a:p>
             <a:pPr/>
+            <a:r>
+              <a:t>1949 год</a:t>
+            </a:r>
           </a:p>
         </p:txBody>
       </p:sp>
+      <p:pic>
+        <p:nvPicPr>
+          <p:cNvPr id="120" name="Image" descr="Image"/>
+          <p:cNvPicPr>
+            <a:picLocks noChangeAspect="1"/>
+          </p:cNvPicPr>
+          <p:nvPr/>
+        </p:nvPicPr>
+        <p:blipFill>
+          <a:blip r:embed="rId2">
+            <a:extLst/>
+          </a:blip>
+          <a:stretch>
+            <a:fillRect/>
+          </a:stretch>
+        </p:blipFill>
+        <p:spPr>
+          <a:xfrm>
+            <a:off x="2682012" y="1015204"/>
+            <a:ext cx="8263845" cy="5842796"/>
+          </a:xfrm>
+          <a:prstGeom prst="rect">
+            <a:avLst/>
+          </a:prstGeom>
+          <a:ln w="12700">
+            <a:miter lim="400000"/>
+          </a:ln>
+        </p:spPr>
+      </p:pic>
     </p:spTree>
   </p:cSld>
   <p:clrMapOvr>
@@ -3676,17 +4102,13 @@
       </p:grpSpPr>
       <p:sp>
         <p:nvSpPr>
-          <p:cNvPr id="118" name="Title 1"/>
+          <p:cNvPr id="122" name="Нейрон и Нейронная сеть"/>
           <p:cNvSpPr txBox="1"/>
           <p:nvPr>
             <p:ph type="title"/>
           </p:nvPr>
         </p:nvSpPr>
         <p:spPr>
-          <a:xfrm>
-            <a:off x="838200" y="365125"/>
-            <a:ext cx="10515600" cy="1325563"/>
-          </a:xfrm>
           <a:prstGeom prst="rect">
             <a:avLst/>
           </a:prstGeom>
@@ -3697,24 +4119,20 @@
           <a:p>
             <a:pPr/>
             <a:r>
-              <a:t>Функция правдоподобия</a:t>
+              <a:t>Нейрон и Нейронная сеть</a:t>
             </a:r>
           </a:p>
         </p:txBody>
       </p:sp>
       <p:sp>
         <p:nvSpPr>
-          <p:cNvPr id="119" name="Content Placeholder 2"/>
+          <p:cNvPr id="123" name="Double-click to edit"/>
           <p:cNvSpPr txBox="1"/>
           <p:nvPr>
             <p:ph type="body" idx="1"/>
           </p:nvPr>
         </p:nvSpPr>
         <p:spPr>
-          <a:xfrm>
-            <a:off x="838200" y="1825625"/>
-            <a:ext cx="10515600" cy="4351338"/>
-          </a:xfrm>
           <a:prstGeom prst="rect">
             <a:avLst/>
           </a:prstGeom>
@@ -3727,35 +4145,6 @@
           </a:p>
         </p:txBody>
       </p:sp>
-      <p:pic>
-        <p:nvPicPr>
-          <p:cNvPr id="120" name="Picture 3" descr="Picture 3"/>
-          <p:cNvPicPr>
-            <a:picLocks noChangeAspect="1"/>
-          </p:cNvPicPr>
-          <p:nvPr/>
-        </p:nvPicPr>
-        <p:blipFill>
-          <a:blip r:embed="rId2">
-            <a:extLst/>
-          </a:blip>
-          <a:stretch>
-            <a:fillRect/>
-          </a:stretch>
-        </p:blipFill>
-        <p:spPr>
-          <a:xfrm>
-            <a:off x="945083" y="1551702"/>
-            <a:ext cx="8649874" cy="5054772"/>
-          </a:xfrm>
-          <a:prstGeom prst="rect">
-            <a:avLst/>
-          </a:prstGeom>
-          <a:ln w="12700">
-            <a:miter lim="400000"/>
-          </a:ln>
-        </p:spPr>
-      </p:pic>
     </p:spTree>
   </p:cSld>
   <p:clrMapOvr>
@@ -3784,7 +4173,7 @@
       </p:grpSpPr>
       <p:sp>
         <p:nvSpPr>
-          <p:cNvPr id="122" name="Title 1"/>
+          <p:cNvPr id="125" name="Title 1"/>
           <p:cNvSpPr txBox="1"/>
           <p:nvPr>
             <p:ph type="title"/>
@@ -3805,14 +4194,14 @@
           <a:p>
             <a:pPr/>
             <a:r>
-              <a:t>Нормализуй это</a:t>
+              <a:t>Ембединги </a:t>
             </a:r>
           </a:p>
         </p:txBody>
       </p:sp>
       <p:sp>
         <p:nvSpPr>
-          <p:cNvPr id="123" name="Content Placeholder 2"/>
+          <p:cNvPr id="126" name="Content Placeholder 2"/>
           <p:cNvSpPr txBox="1"/>
           <p:nvPr>
             <p:ph type="body" idx="1"/>

</xml_diff>